<commit_message>
Use dynamic figure reference and remove margins
</commit_message>
<xml_diff>
--- a/content/images/biotm.pptx
+++ b/content/images/biotm.pptx
@@ -112,6 +112,10 @@
 </p:presentation>
 </file>
 
+<file path=ppt/revisionInfo.xml><?xml version="1.0" encoding="utf-8"?>
+<p1510:revInfo xmlns:a="http://schemas.openxmlformats.org/drawingml/2006/main" xmlns:r="http://schemas.openxmlformats.org/officeDocument/2006/relationships" xmlns:p1510="http://schemas.microsoft.com/office/powerpoint/2015/10/main"/>
+</file>
+
 <file path=ppt/slideLayouts/slideLayout1.xml><?xml version="1.0" encoding="utf-8"?>
 <p:sldLayout xmlns:a="http://schemas.openxmlformats.org/drawingml/2006/main" xmlns:r="http://schemas.openxmlformats.org/officeDocument/2006/relationships" xmlns:p="http://schemas.openxmlformats.org/presentationml/2006/main" type="title" preserve="1">
   <p:cSld name="Title Slide">
@@ -241,7 +245,7 @@
           <a:p>
             <a:fld id="{8B9D8F2E-F0F7-6148-A130-D056843259D2}" type="datetimeFigureOut">
               <a:rPr lang="en-US" smtClean="0"/>
-              <a:t>8/10/2017</a:t>
+              <a:t>11/10/2017</a:t>
             </a:fld>
             <a:endParaRPr lang="en-US"/>
           </a:p>
@@ -409,7 +413,7 @@
           <a:p>
             <a:fld id="{8B9D8F2E-F0F7-6148-A130-D056843259D2}" type="datetimeFigureOut">
               <a:rPr lang="en-US" smtClean="0"/>
-              <a:t>8/10/2017</a:t>
+              <a:t>11/10/2017</a:t>
             </a:fld>
             <a:endParaRPr lang="en-US"/>
           </a:p>
@@ -587,7 +591,7 @@
           <a:p>
             <a:fld id="{8B9D8F2E-F0F7-6148-A130-D056843259D2}" type="datetimeFigureOut">
               <a:rPr lang="en-US" smtClean="0"/>
-              <a:t>8/10/2017</a:t>
+              <a:t>11/10/2017</a:t>
             </a:fld>
             <a:endParaRPr lang="en-US"/>
           </a:p>
@@ -755,7 +759,7 @@
           <a:p>
             <a:fld id="{8B9D8F2E-F0F7-6148-A130-D056843259D2}" type="datetimeFigureOut">
               <a:rPr lang="en-US" smtClean="0"/>
-              <a:t>8/10/2017</a:t>
+              <a:t>11/10/2017</a:t>
             </a:fld>
             <a:endParaRPr lang="en-US"/>
           </a:p>
@@ -1000,7 +1004,7 @@
           <a:p>
             <a:fld id="{8B9D8F2E-F0F7-6148-A130-D056843259D2}" type="datetimeFigureOut">
               <a:rPr lang="en-US" smtClean="0"/>
-              <a:t>8/10/2017</a:t>
+              <a:t>11/10/2017</a:t>
             </a:fld>
             <a:endParaRPr lang="en-US"/>
           </a:p>
@@ -1229,7 +1233,7 @@
           <a:p>
             <a:fld id="{8B9D8F2E-F0F7-6148-A130-D056843259D2}" type="datetimeFigureOut">
               <a:rPr lang="en-US" smtClean="0"/>
-              <a:t>8/10/2017</a:t>
+              <a:t>11/10/2017</a:t>
             </a:fld>
             <a:endParaRPr lang="en-US"/>
           </a:p>
@@ -1593,7 +1597,7 @@
           <a:p>
             <a:fld id="{8B9D8F2E-F0F7-6148-A130-D056843259D2}" type="datetimeFigureOut">
               <a:rPr lang="en-US" smtClean="0"/>
-              <a:t>8/10/2017</a:t>
+              <a:t>11/10/2017</a:t>
             </a:fld>
             <a:endParaRPr lang="en-US"/>
           </a:p>
@@ -1710,7 +1714,7 @@
           <a:p>
             <a:fld id="{8B9D8F2E-F0F7-6148-A130-D056843259D2}" type="datetimeFigureOut">
               <a:rPr lang="en-US" smtClean="0"/>
-              <a:t>8/10/2017</a:t>
+              <a:t>11/10/2017</a:t>
             </a:fld>
             <a:endParaRPr lang="en-US"/>
           </a:p>
@@ -1805,7 +1809,7 @@
           <a:p>
             <a:fld id="{8B9D8F2E-F0F7-6148-A130-D056843259D2}" type="datetimeFigureOut">
               <a:rPr lang="en-US" smtClean="0"/>
-              <a:t>8/10/2017</a:t>
+              <a:t>11/10/2017</a:t>
             </a:fld>
             <a:endParaRPr lang="en-US"/>
           </a:p>
@@ -2080,7 +2084,7 @@
           <a:p>
             <a:fld id="{8B9D8F2E-F0F7-6148-A130-D056843259D2}" type="datetimeFigureOut">
               <a:rPr lang="en-US" smtClean="0"/>
-              <a:t>8/10/2017</a:t>
+              <a:t>11/10/2017</a:t>
             </a:fld>
             <a:endParaRPr lang="en-US"/>
           </a:p>
@@ -2332,7 +2336,7 @@
           <a:p>
             <a:fld id="{8B9D8F2E-F0F7-6148-A130-D056843259D2}" type="datetimeFigureOut">
               <a:rPr lang="en-US" smtClean="0"/>
-              <a:t>8/10/2017</a:t>
+              <a:t>11/10/2017</a:t>
             </a:fld>
             <a:endParaRPr lang="en-US"/>
           </a:p>
@@ -2543,7 +2547,7 @@
           <a:p>
             <a:fld id="{8B9D8F2E-F0F7-6148-A130-D056843259D2}" type="datetimeFigureOut">
               <a:rPr lang="en-US" smtClean="0"/>
-              <a:t>8/10/2017</a:t>
+              <a:t>11/10/2017</a:t>
             </a:fld>
             <a:endParaRPr lang="en-US"/>
           </a:p>
@@ -2948,356 +2952,362 @@
           <a:chExt cx="0" cy="0"/>
         </a:xfrm>
       </p:grpSpPr>
-      <p:cxnSp>
-        <p:nvCxnSpPr>
-          <p:cNvPr id="35" name="Straight Connector 34"/>
-          <p:cNvCxnSpPr/>
-          <p:nvPr/>
-        </p:nvCxnSpPr>
-        <p:spPr>
-          <a:xfrm>
-            <a:off x="135119" y="3656162"/>
-            <a:ext cx="11727559" cy="0"/>
-          </a:xfrm>
-          <a:prstGeom prst="line">
-            <a:avLst/>
-          </a:prstGeom>
-          <a:ln w="38100">
-            <a:solidFill>
-              <a:schemeClr val="bg2">
-                <a:lumMod val="75000"/>
-              </a:schemeClr>
-            </a:solidFill>
-            <a:prstDash val="sysDash"/>
-          </a:ln>
-        </p:spPr>
-        <p:style>
-          <a:lnRef idx="1">
-            <a:schemeClr val="accent1"/>
-          </a:lnRef>
-          <a:fillRef idx="0">
-            <a:schemeClr val="accent1"/>
-          </a:fillRef>
-          <a:effectRef idx="0">
-            <a:schemeClr val="accent1"/>
-          </a:effectRef>
-          <a:fontRef idx="minor">
-            <a:schemeClr val="tx1"/>
-          </a:fontRef>
-        </p:style>
-      </p:cxnSp>
-      <p:cxnSp>
-        <p:nvCxnSpPr>
-          <p:cNvPr id="13" name="Straight Connector 12"/>
-          <p:cNvCxnSpPr/>
-          <p:nvPr/>
-        </p:nvCxnSpPr>
-        <p:spPr>
-          <a:xfrm>
-            <a:off x="64780" y="1866780"/>
-            <a:ext cx="11727559" cy="0"/>
-          </a:xfrm>
-          <a:prstGeom prst="line">
-            <a:avLst/>
-          </a:prstGeom>
-          <a:ln w="38100">
-            <a:solidFill>
-              <a:schemeClr val="bg2">
-                <a:lumMod val="75000"/>
-              </a:schemeClr>
-            </a:solidFill>
-            <a:prstDash val="sysDash"/>
-          </a:ln>
-        </p:spPr>
-        <p:style>
-          <a:lnRef idx="1">
-            <a:schemeClr val="accent1"/>
-          </a:lnRef>
-          <a:fillRef idx="0">
-            <a:schemeClr val="accent1"/>
-          </a:fillRef>
-          <a:effectRef idx="0">
-            <a:schemeClr val="accent1"/>
-          </a:effectRef>
-          <a:fontRef idx="minor">
-            <a:schemeClr val="tx1"/>
-          </a:fontRef>
-        </p:style>
-      </p:cxnSp>
       <p:grpSp>
         <p:nvGrpSpPr>
-          <p:cNvPr id="14" name="Group 13"/>
+          <p:cNvPr id="27" name="Group 26">
+            <a:extLst>
+              <a:ext uri="{FF2B5EF4-FFF2-40B4-BE49-F238E27FC236}">
+                <a16:creationId xmlns:a16="http://schemas.microsoft.com/office/drawing/2014/main" id="{E0B44243-5407-49A9-958F-07591560B72F}"/>
+              </a:ext>
+            </a:extLst>
+          </p:cNvPr>
           <p:cNvGrpSpPr/>
           <p:nvPr/>
         </p:nvGrpSpPr>
         <p:grpSpPr>
           <a:xfrm>
-            <a:off x="3337214" y="612214"/>
-            <a:ext cx="3721261" cy="719750"/>
-            <a:chOff x="3351959" y="612214"/>
-            <a:chExt cx="3721261" cy="719750"/>
+            <a:off x="64780" y="612214"/>
+            <a:ext cx="11895398" cy="4298513"/>
+            <a:chOff x="64780" y="612214"/>
+            <a:chExt cx="11895398" cy="4298513"/>
           </a:xfrm>
         </p:grpSpPr>
-        <p:sp>
-          <p:nvSpPr>
-            <p:cNvPr id="2" name="Rounded Rectangle 1"/>
-            <p:cNvSpPr/>
+        <p:cxnSp>
+          <p:nvCxnSpPr>
+            <p:cNvPr id="35" name="Straight Connector 34"/>
+            <p:cNvCxnSpPr/>
             <p:nvPr/>
-          </p:nvSpPr>
+          </p:nvCxnSpPr>
           <p:spPr>
             <a:xfrm>
-              <a:off x="5606559" y="612214"/>
-              <a:ext cx="1466661" cy="719750"/>
+              <a:off x="135119" y="3656162"/>
+              <a:ext cx="11727559" cy="0"/>
             </a:xfrm>
-            <a:prstGeom prst="roundRect">
+            <a:prstGeom prst="line">
               <a:avLst/>
             </a:prstGeom>
-            <a:ln w="25400"/>
+            <a:ln w="38100">
+              <a:solidFill>
+                <a:schemeClr val="bg2">
+                  <a:lumMod val="75000"/>
+                </a:schemeClr>
+              </a:solidFill>
+              <a:prstDash val="sysDash"/>
+            </a:ln>
           </p:spPr>
           <p:style>
-            <a:lnRef idx="2">
-              <a:schemeClr val="dk1"/>
+            <a:lnRef idx="1">
+              <a:schemeClr val="accent1"/>
             </a:lnRef>
-            <a:fillRef idx="1">
-              <a:schemeClr val="lt1"/>
+            <a:fillRef idx="0">
+              <a:schemeClr val="accent1"/>
             </a:fillRef>
             <a:effectRef idx="0">
-              <a:schemeClr val="dk1"/>
+              <a:schemeClr val="accent1"/>
             </a:effectRef>
             <a:fontRef idx="minor">
-              <a:schemeClr val="dk1"/>
+              <a:schemeClr val="tx1"/>
             </a:fontRef>
           </p:style>
-          <p:txBody>
-            <a:bodyPr rtlCol="0" anchor="ctr"/>
-            <a:lstStyle/>
-            <a:p>
-              <a:pPr algn="ctr"/>
-              <a:r>
-                <a:rPr lang="en-US" b="1" dirty="0">
-                  <a:solidFill>
-                    <a:schemeClr val="tx1"/>
-                  </a:solidFill>
-                </a:rPr>
-                <a:t>Clinical</a:t>
-              </a:r>
-            </a:p>
-          </p:txBody>
-        </p:sp>
-        <p:sp>
-          <p:nvSpPr>
-            <p:cNvPr id="5" name="Rounded Rectangle 4"/>
-            <p:cNvSpPr/>
+        </p:cxnSp>
+        <p:cxnSp>
+          <p:nvCxnSpPr>
+            <p:cNvPr id="13" name="Straight Connector 12"/>
+            <p:cNvCxnSpPr/>
             <p:nvPr/>
-          </p:nvSpPr>
+          </p:nvCxnSpPr>
           <p:spPr>
             <a:xfrm>
-              <a:off x="3351959" y="612214"/>
-              <a:ext cx="1466661" cy="719750"/>
+              <a:off x="64780" y="1866780"/>
+              <a:ext cx="11727559" cy="0"/>
             </a:xfrm>
-            <a:prstGeom prst="roundRect">
+            <a:prstGeom prst="line">
               <a:avLst/>
             </a:prstGeom>
-            <a:ln w="25400"/>
+            <a:ln w="38100">
+              <a:solidFill>
+                <a:schemeClr val="bg2">
+                  <a:lumMod val="75000"/>
+                </a:schemeClr>
+              </a:solidFill>
+              <a:prstDash val="sysDash"/>
+            </a:ln>
           </p:spPr>
           <p:style>
-            <a:lnRef idx="2">
-              <a:schemeClr val="dk1"/>
+            <a:lnRef idx="1">
+              <a:schemeClr val="accent1"/>
             </a:lnRef>
-            <a:fillRef idx="1">
-              <a:schemeClr val="lt1"/>
+            <a:fillRef idx="0">
+              <a:schemeClr val="accent1"/>
             </a:fillRef>
             <a:effectRef idx="0">
-              <a:schemeClr val="dk1"/>
+              <a:schemeClr val="accent1"/>
             </a:effectRef>
             <a:fontRef idx="minor">
-              <a:schemeClr val="dk1"/>
+              <a:schemeClr val="tx1"/>
             </a:fontRef>
           </p:style>
-          <p:txBody>
-            <a:bodyPr rtlCol="0" anchor="ctr"/>
-            <a:lstStyle/>
-            <a:p>
-              <a:pPr algn="ctr"/>
-              <a:r>
-                <a:rPr lang="en-US" b="1" dirty="0">
-                  <a:solidFill>
-                    <a:schemeClr val="tx1"/>
-                  </a:solidFill>
-                </a:rPr>
-                <a:t>Biological</a:t>
-              </a:r>
-            </a:p>
-          </p:txBody>
-        </p:sp>
-      </p:grpSp>
-      <p:grpSp>
-        <p:nvGrpSpPr>
-          <p:cNvPr id="17" name="Group 16"/>
-          <p:cNvGrpSpPr/>
-          <p:nvPr/>
-        </p:nvGrpSpPr>
-        <p:grpSpPr>
-          <a:xfrm>
-            <a:off x="891927" y="2401596"/>
-            <a:ext cx="8611835" cy="719750"/>
-            <a:chOff x="764303" y="2369860"/>
-            <a:chExt cx="8611835" cy="719750"/>
-          </a:xfrm>
-        </p:grpSpPr>
-        <p:sp>
-          <p:nvSpPr>
-            <p:cNvPr id="4" name="Rounded Rectangle 3"/>
-            <p:cNvSpPr/>
+        </p:cxnSp>
+        <p:grpSp>
+          <p:nvGrpSpPr>
+            <p:cNvPr id="14" name="Group 13"/>
+            <p:cNvGrpSpPr/>
             <p:nvPr/>
-          </p:nvSpPr>
-          <p:spPr>
+          </p:nvGrpSpPr>
+          <p:grpSpPr>
             <a:xfrm>
-              <a:off x="764303" y="2369860"/>
-              <a:ext cx="1658386" cy="719750"/>
+              <a:off x="3337214" y="612214"/>
+              <a:ext cx="3721261" cy="719750"/>
+              <a:chOff x="3351959" y="612214"/>
+              <a:chExt cx="3721261" cy="719750"/>
             </a:xfrm>
-            <a:prstGeom prst="roundRect">
-              <a:avLst/>
-            </a:prstGeom>
-            <a:ln w="25400"/>
-          </p:spPr>
-          <p:style>
-            <a:lnRef idx="2">
-              <a:schemeClr val="dk1"/>
-            </a:lnRef>
-            <a:fillRef idx="1">
-              <a:schemeClr val="lt1"/>
-            </a:fillRef>
-            <a:effectRef idx="0">
-              <a:schemeClr val="dk1"/>
-            </a:effectRef>
-            <a:fontRef idx="minor">
-              <a:schemeClr val="dk1"/>
-            </a:fontRef>
-          </p:style>
-          <p:txBody>
-            <a:bodyPr rtlCol="0" anchor="ctr"/>
-            <a:lstStyle/>
-            <a:p>
-              <a:pPr algn="ctr"/>
-              <a:r>
-                <a:rPr lang="en-US" b="1" dirty="0">
-                  <a:solidFill>
-                    <a:schemeClr val="tx1"/>
-                  </a:solidFill>
-                </a:rPr>
-                <a:t>Named entity recognition</a:t>
-              </a:r>
-            </a:p>
-          </p:txBody>
-        </p:sp>
-        <p:sp>
-          <p:nvSpPr>
-            <p:cNvPr id="6" name="Rounded Rectangle 5"/>
-            <p:cNvSpPr/>
+          </p:grpSpPr>
+          <p:sp>
+            <p:nvSpPr>
+              <p:cNvPr id="2" name="Rounded Rectangle 1"/>
+              <p:cNvSpPr/>
+              <p:nvPr/>
+            </p:nvSpPr>
+            <p:spPr>
+              <a:xfrm>
+                <a:off x="5606559" y="612214"/>
+                <a:ext cx="1466661" cy="719750"/>
+              </a:xfrm>
+              <a:prstGeom prst="roundRect">
+                <a:avLst/>
+              </a:prstGeom>
+              <a:ln w="25400"/>
+            </p:spPr>
+            <p:style>
+              <a:lnRef idx="2">
+                <a:schemeClr val="dk1"/>
+              </a:lnRef>
+              <a:fillRef idx="1">
+                <a:schemeClr val="lt1"/>
+              </a:fillRef>
+              <a:effectRef idx="0">
+                <a:schemeClr val="dk1"/>
+              </a:effectRef>
+              <a:fontRef idx="minor">
+                <a:schemeClr val="dk1"/>
+              </a:fontRef>
+            </p:style>
+            <p:txBody>
+              <a:bodyPr rtlCol="0" anchor="ctr"/>
+              <a:lstStyle/>
+              <a:p>
+                <a:pPr algn="ctr"/>
+                <a:r>
+                  <a:rPr lang="en-US" b="1" dirty="0">
+                    <a:solidFill>
+                      <a:schemeClr val="tx1"/>
+                    </a:solidFill>
+                  </a:rPr>
+                  <a:t>Clinical</a:t>
+                </a:r>
+              </a:p>
+            </p:txBody>
+          </p:sp>
+          <p:sp>
+            <p:nvSpPr>
+              <p:cNvPr id="5" name="Rounded Rectangle 4"/>
+              <p:cNvSpPr/>
+              <p:nvPr/>
+            </p:nvSpPr>
+            <p:spPr>
+              <a:xfrm>
+                <a:off x="3351959" y="612214"/>
+                <a:ext cx="1466661" cy="719750"/>
+              </a:xfrm>
+              <a:prstGeom prst="roundRect">
+                <a:avLst/>
+              </a:prstGeom>
+              <a:ln w="25400"/>
+            </p:spPr>
+            <p:style>
+              <a:lnRef idx="2">
+                <a:schemeClr val="dk1"/>
+              </a:lnRef>
+              <a:fillRef idx="1">
+                <a:schemeClr val="lt1"/>
+              </a:fillRef>
+              <a:effectRef idx="0">
+                <a:schemeClr val="dk1"/>
+              </a:effectRef>
+              <a:fontRef idx="minor">
+                <a:schemeClr val="dk1"/>
+              </a:fontRef>
+            </p:style>
+            <p:txBody>
+              <a:bodyPr rtlCol="0" anchor="ctr"/>
+              <a:lstStyle/>
+              <a:p>
+                <a:pPr algn="ctr"/>
+                <a:r>
+                  <a:rPr lang="en-US" b="1" dirty="0">
+                    <a:solidFill>
+                      <a:schemeClr val="tx1"/>
+                    </a:solidFill>
+                  </a:rPr>
+                  <a:t>Biological</a:t>
+                </a:r>
+              </a:p>
+            </p:txBody>
+          </p:sp>
+        </p:grpSp>
+        <p:grpSp>
+          <p:nvGrpSpPr>
+            <p:cNvPr id="17" name="Group 16"/>
+            <p:cNvGrpSpPr/>
             <p:nvPr/>
-          </p:nvSpPr>
-          <p:spPr>
+          </p:nvGrpSpPr>
+          <p:grpSpPr>
             <a:xfrm>
-              <a:off x="4213816" y="2369860"/>
-              <a:ext cx="1712808" cy="719750"/>
+              <a:off x="891927" y="2401596"/>
+              <a:ext cx="8611835" cy="719750"/>
+              <a:chOff x="764303" y="2369860"/>
+              <a:chExt cx="8611835" cy="719750"/>
             </a:xfrm>
-            <a:prstGeom prst="roundRect">
-              <a:avLst/>
-            </a:prstGeom>
-            <a:ln w="25400"/>
-          </p:spPr>
-          <p:style>
-            <a:lnRef idx="2">
-              <a:schemeClr val="dk1"/>
-            </a:lnRef>
-            <a:fillRef idx="1">
-              <a:schemeClr val="lt1"/>
-            </a:fillRef>
-            <a:effectRef idx="0">
-              <a:schemeClr val="dk1"/>
-            </a:effectRef>
-            <a:fontRef idx="minor">
-              <a:schemeClr val="dk1"/>
-            </a:fontRef>
-          </p:style>
-          <p:txBody>
-            <a:bodyPr rtlCol="0" anchor="ctr"/>
-            <a:lstStyle/>
-            <a:p>
-              <a:pPr algn="ctr"/>
-              <a:r>
-                <a:rPr lang="en-US" b="1" dirty="0">
-                  <a:solidFill>
-                    <a:schemeClr val="tx1"/>
-                  </a:solidFill>
-                </a:rPr>
-                <a:t>Relation/Event extraction</a:t>
-              </a:r>
-            </a:p>
-          </p:txBody>
-        </p:sp>
-        <p:sp>
-          <p:nvSpPr>
-            <p:cNvPr id="8" name="Rounded Rectangle 7"/>
-            <p:cNvSpPr/>
-            <p:nvPr/>
-          </p:nvSpPr>
-          <p:spPr>
-            <a:xfrm>
-              <a:off x="7717752" y="2369860"/>
-              <a:ext cx="1658386" cy="719750"/>
-            </a:xfrm>
-            <a:prstGeom prst="roundRect">
-              <a:avLst/>
-            </a:prstGeom>
-            <a:ln w="25400"/>
-          </p:spPr>
-          <p:style>
-            <a:lnRef idx="2">
-              <a:schemeClr val="dk1"/>
-            </a:lnRef>
-            <a:fillRef idx="1">
-              <a:schemeClr val="lt1"/>
-            </a:fillRef>
-            <a:effectRef idx="0">
-              <a:schemeClr val="dk1"/>
-            </a:effectRef>
-            <a:fontRef idx="minor">
-              <a:schemeClr val="dk1"/>
-            </a:fontRef>
-          </p:style>
-          <p:txBody>
-            <a:bodyPr rtlCol="0" anchor="ctr"/>
-            <a:lstStyle/>
-            <a:p>
-              <a:pPr algn="ctr"/>
-              <a:r>
-                <a:rPr lang="en-US" b="1" dirty="0">
-                  <a:solidFill>
-                    <a:schemeClr val="tx1"/>
-                  </a:solidFill>
-                </a:rPr>
-                <a:t>Information retrieval</a:t>
-              </a:r>
-            </a:p>
-          </p:txBody>
-        </p:sp>
-      </p:grpSp>
-      <p:grpSp>
-        <p:nvGrpSpPr>
-          <p:cNvPr id="18" name="Group 17"/>
-          <p:cNvGrpSpPr/>
-          <p:nvPr/>
-        </p:nvGrpSpPr>
-        <p:grpSpPr>
-          <a:xfrm>
-            <a:off x="718908" y="4190977"/>
-            <a:ext cx="8957873" cy="719750"/>
-            <a:chOff x="718908" y="4190977"/>
-            <a:chExt cx="8957873" cy="719750"/>
-          </a:xfrm>
-        </p:grpSpPr>
+          </p:grpSpPr>
+          <p:sp>
+            <p:nvSpPr>
+              <p:cNvPr id="4" name="Rounded Rectangle 3"/>
+              <p:cNvSpPr/>
+              <p:nvPr/>
+            </p:nvSpPr>
+            <p:spPr>
+              <a:xfrm>
+                <a:off x="764303" y="2369860"/>
+                <a:ext cx="1658386" cy="719750"/>
+              </a:xfrm>
+              <a:prstGeom prst="roundRect">
+                <a:avLst/>
+              </a:prstGeom>
+              <a:ln w="25400"/>
+            </p:spPr>
+            <p:style>
+              <a:lnRef idx="2">
+                <a:schemeClr val="dk1"/>
+              </a:lnRef>
+              <a:fillRef idx="1">
+                <a:schemeClr val="lt1"/>
+              </a:fillRef>
+              <a:effectRef idx="0">
+                <a:schemeClr val="dk1"/>
+              </a:effectRef>
+              <a:fontRef idx="minor">
+                <a:schemeClr val="dk1"/>
+              </a:fontRef>
+            </p:style>
+            <p:txBody>
+              <a:bodyPr rtlCol="0" anchor="ctr"/>
+              <a:lstStyle/>
+              <a:p>
+                <a:pPr algn="ctr"/>
+                <a:r>
+                  <a:rPr lang="en-US" b="1" dirty="0">
+                    <a:solidFill>
+                      <a:schemeClr val="tx1"/>
+                    </a:solidFill>
+                  </a:rPr>
+                  <a:t>Named entity recognition</a:t>
+                </a:r>
+              </a:p>
+            </p:txBody>
+          </p:sp>
+          <p:sp>
+            <p:nvSpPr>
+              <p:cNvPr id="6" name="Rounded Rectangle 5"/>
+              <p:cNvSpPr/>
+              <p:nvPr/>
+            </p:nvSpPr>
+            <p:spPr>
+              <a:xfrm>
+                <a:off x="4213816" y="2369860"/>
+                <a:ext cx="1712808" cy="719750"/>
+              </a:xfrm>
+              <a:prstGeom prst="roundRect">
+                <a:avLst/>
+              </a:prstGeom>
+              <a:ln w="25400"/>
+            </p:spPr>
+            <p:style>
+              <a:lnRef idx="2">
+                <a:schemeClr val="dk1"/>
+              </a:lnRef>
+              <a:fillRef idx="1">
+                <a:schemeClr val="lt1"/>
+              </a:fillRef>
+              <a:effectRef idx="0">
+                <a:schemeClr val="dk1"/>
+              </a:effectRef>
+              <a:fontRef idx="minor">
+                <a:schemeClr val="dk1"/>
+              </a:fontRef>
+            </p:style>
+            <p:txBody>
+              <a:bodyPr rtlCol="0" anchor="ctr"/>
+              <a:lstStyle/>
+              <a:p>
+                <a:pPr algn="ctr"/>
+                <a:r>
+                  <a:rPr lang="en-US" b="1" dirty="0">
+                    <a:solidFill>
+                      <a:schemeClr val="tx1"/>
+                    </a:solidFill>
+                  </a:rPr>
+                  <a:t>Relation/Event extraction</a:t>
+                </a:r>
+              </a:p>
+            </p:txBody>
+          </p:sp>
+          <p:sp>
+            <p:nvSpPr>
+              <p:cNvPr id="8" name="Rounded Rectangle 7"/>
+              <p:cNvSpPr/>
+              <p:nvPr/>
+            </p:nvSpPr>
+            <p:spPr>
+              <a:xfrm>
+                <a:off x="7717752" y="2369860"/>
+                <a:ext cx="1658386" cy="719750"/>
+              </a:xfrm>
+              <a:prstGeom prst="roundRect">
+                <a:avLst/>
+              </a:prstGeom>
+              <a:ln w="25400"/>
+            </p:spPr>
+            <p:style>
+              <a:lnRef idx="2">
+                <a:schemeClr val="dk1"/>
+              </a:lnRef>
+              <a:fillRef idx="1">
+                <a:schemeClr val="lt1"/>
+              </a:fillRef>
+              <a:effectRef idx="0">
+                <a:schemeClr val="dk1"/>
+              </a:effectRef>
+              <a:fontRef idx="minor">
+                <a:schemeClr val="dk1"/>
+              </a:fontRef>
+            </p:style>
+            <p:txBody>
+              <a:bodyPr rtlCol="0" anchor="ctr"/>
+              <a:lstStyle/>
+              <a:p>
+                <a:pPr algn="ctr"/>
+                <a:r>
+                  <a:rPr lang="en-US" b="1" dirty="0">
+                    <a:solidFill>
+                      <a:schemeClr val="tx1"/>
+                    </a:solidFill>
+                  </a:rPr>
+                  <a:t>Information retrieval</a:t>
+                </a:r>
+              </a:p>
+            </p:txBody>
+          </p:sp>
+        </p:grpSp>
         <p:sp>
           <p:nvSpPr>
             <p:cNvPr id="9" name="Rounded Rectangle 8"/>
@@ -3352,7 +3362,7 @@
           </p:nvSpPr>
           <p:spPr>
             <a:xfrm>
-              <a:off x="3016563" y="4190977"/>
+              <a:off x="5550798" y="4190977"/>
               <a:ext cx="1793893" cy="719750"/>
             </a:xfrm>
             <a:prstGeom prst="roundRect">
@@ -3398,7 +3408,7 @@
           </p:nvSpPr>
           <p:spPr>
             <a:xfrm>
-              <a:off x="5449725" y="4190977"/>
+              <a:off x="3137401" y="4190977"/>
               <a:ext cx="1793893" cy="719750"/>
             </a:xfrm>
             <a:prstGeom prst="roundRect">
@@ -3482,541 +3492,541 @@
             </a:p>
           </p:txBody>
         </p:sp>
+        <p:cxnSp>
+          <p:nvCxnSpPr>
+            <p:cNvPr id="15" name="Straight Connector 14"/>
+            <p:cNvCxnSpPr>
+              <a:stCxn id="5" idx="2"/>
+              <a:endCxn id="4" idx="0"/>
+            </p:cNvCxnSpPr>
+            <p:nvPr/>
+          </p:nvCxnSpPr>
+          <p:spPr>
+            <a:xfrm flipH="1">
+              <a:off x="1721120" y="1331964"/>
+              <a:ext cx="2349425" cy="1069632"/>
+            </a:xfrm>
+            <a:prstGeom prst="line">
+              <a:avLst/>
+            </a:prstGeom>
+            <a:ln w="19050"/>
+          </p:spPr>
+          <p:style>
+            <a:lnRef idx="2">
+              <a:schemeClr val="dk1"/>
+            </a:lnRef>
+            <a:fillRef idx="1">
+              <a:schemeClr val="lt1"/>
+            </a:fillRef>
+            <a:effectRef idx="0">
+              <a:schemeClr val="dk1"/>
+            </a:effectRef>
+            <a:fontRef idx="minor">
+              <a:schemeClr val="dk1"/>
+            </a:fontRef>
+          </p:style>
+        </p:cxnSp>
+        <p:cxnSp>
+          <p:nvCxnSpPr>
+            <p:cNvPr id="16" name="Straight Connector 15"/>
+            <p:cNvCxnSpPr>
+              <a:stCxn id="5" idx="2"/>
+              <a:endCxn id="6" idx="0"/>
+            </p:cNvCxnSpPr>
+            <p:nvPr/>
+          </p:nvCxnSpPr>
+          <p:spPr>
+            <a:xfrm>
+              <a:off x="4070545" y="1331964"/>
+              <a:ext cx="1127299" cy="1069632"/>
+            </a:xfrm>
+            <a:prstGeom prst="line">
+              <a:avLst/>
+            </a:prstGeom>
+            <a:ln w="19050"/>
+          </p:spPr>
+          <p:style>
+            <a:lnRef idx="2">
+              <a:schemeClr val="dk1"/>
+            </a:lnRef>
+            <a:fillRef idx="1">
+              <a:schemeClr val="lt1"/>
+            </a:fillRef>
+            <a:effectRef idx="0">
+              <a:schemeClr val="dk1"/>
+            </a:effectRef>
+            <a:fontRef idx="minor">
+              <a:schemeClr val="dk1"/>
+            </a:fontRef>
+          </p:style>
+        </p:cxnSp>
+        <p:cxnSp>
+          <p:nvCxnSpPr>
+            <p:cNvPr id="22" name="Straight Connector 21"/>
+            <p:cNvCxnSpPr>
+              <a:stCxn id="5" idx="2"/>
+              <a:endCxn id="8" idx="0"/>
+            </p:cNvCxnSpPr>
+            <p:nvPr/>
+          </p:nvCxnSpPr>
+          <p:spPr>
+            <a:xfrm>
+              <a:off x="4070545" y="1331964"/>
+              <a:ext cx="4604024" cy="1069632"/>
+            </a:xfrm>
+            <a:prstGeom prst="line">
+              <a:avLst/>
+            </a:prstGeom>
+            <a:ln w="19050"/>
+          </p:spPr>
+          <p:style>
+            <a:lnRef idx="2">
+              <a:schemeClr val="dk1"/>
+            </a:lnRef>
+            <a:fillRef idx="1">
+              <a:schemeClr val="lt1"/>
+            </a:fillRef>
+            <a:effectRef idx="0">
+              <a:schemeClr val="dk1"/>
+            </a:effectRef>
+            <a:fontRef idx="minor">
+              <a:schemeClr val="dk1"/>
+            </a:fontRef>
+          </p:style>
+        </p:cxnSp>
+        <p:cxnSp>
+          <p:nvCxnSpPr>
+            <p:cNvPr id="25" name="Straight Connector 24"/>
+            <p:cNvCxnSpPr>
+              <a:stCxn id="2" idx="2"/>
+              <a:endCxn id="4" idx="0"/>
+            </p:cNvCxnSpPr>
+            <p:nvPr/>
+          </p:nvCxnSpPr>
+          <p:spPr>
+            <a:xfrm flipH="1">
+              <a:off x="1721120" y="1331964"/>
+              <a:ext cx="4604025" cy="1069632"/>
+            </a:xfrm>
+            <a:prstGeom prst="line">
+              <a:avLst/>
+            </a:prstGeom>
+            <a:ln w="19050"/>
+          </p:spPr>
+          <p:style>
+            <a:lnRef idx="2">
+              <a:schemeClr val="dk1"/>
+            </a:lnRef>
+            <a:fillRef idx="1">
+              <a:schemeClr val="lt1"/>
+            </a:fillRef>
+            <a:effectRef idx="0">
+              <a:schemeClr val="dk1"/>
+            </a:effectRef>
+            <a:fontRef idx="minor">
+              <a:schemeClr val="dk1"/>
+            </a:fontRef>
+          </p:style>
+        </p:cxnSp>
+        <p:cxnSp>
+          <p:nvCxnSpPr>
+            <p:cNvPr id="28" name="Straight Connector 27"/>
+            <p:cNvCxnSpPr>
+              <a:stCxn id="2" idx="2"/>
+              <a:endCxn id="6" idx="0"/>
+            </p:cNvCxnSpPr>
+            <p:nvPr/>
+          </p:nvCxnSpPr>
+          <p:spPr>
+            <a:xfrm flipH="1">
+              <a:off x="5197844" y="1331964"/>
+              <a:ext cx="1127301" cy="1069632"/>
+            </a:xfrm>
+            <a:prstGeom prst="line">
+              <a:avLst/>
+            </a:prstGeom>
+            <a:ln w="19050"/>
+          </p:spPr>
+          <p:style>
+            <a:lnRef idx="2">
+              <a:schemeClr val="dk1"/>
+            </a:lnRef>
+            <a:fillRef idx="1">
+              <a:schemeClr val="lt1"/>
+            </a:fillRef>
+            <a:effectRef idx="0">
+              <a:schemeClr val="dk1"/>
+            </a:effectRef>
+            <a:fontRef idx="minor">
+              <a:schemeClr val="dk1"/>
+            </a:fontRef>
+          </p:style>
+        </p:cxnSp>
+        <p:cxnSp>
+          <p:nvCxnSpPr>
+            <p:cNvPr id="31" name="Straight Connector 30"/>
+            <p:cNvCxnSpPr>
+              <a:stCxn id="4" idx="2"/>
+              <a:endCxn id="9" idx="0"/>
+            </p:cNvCxnSpPr>
+            <p:nvPr/>
+          </p:nvCxnSpPr>
+          <p:spPr>
+            <a:xfrm flipH="1">
+              <a:off x="1548101" y="3121346"/>
+              <a:ext cx="173019" cy="1069631"/>
+            </a:xfrm>
+            <a:prstGeom prst="line">
+              <a:avLst/>
+            </a:prstGeom>
+            <a:ln w="19050"/>
+          </p:spPr>
+          <p:style>
+            <a:lnRef idx="2">
+              <a:schemeClr val="dk1"/>
+            </a:lnRef>
+            <a:fillRef idx="1">
+              <a:schemeClr val="lt1"/>
+            </a:fillRef>
+            <a:effectRef idx="0">
+              <a:schemeClr val="dk1"/>
+            </a:effectRef>
+            <a:fontRef idx="minor">
+              <a:schemeClr val="dk1"/>
+            </a:fontRef>
+          </p:style>
+        </p:cxnSp>
+        <p:cxnSp>
+          <p:nvCxnSpPr>
+            <p:cNvPr id="34" name="Straight Connector 33"/>
+            <p:cNvCxnSpPr>
+              <a:stCxn id="6" idx="2"/>
+              <a:endCxn id="9" idx="0"/>
+            </p:cNvCxnSpPr>
+            <p:nvPr/>
+          </p:nvCxnSpPr>
+          <p:spPr>
+            <a:xfrm flipH="1">
+              <a:off x="1548101" y="3121346"/>
+              <a:ext cx="3649743" cy="1069631"/>
+            </a:xfrm>
+            <a:prstGeom prst="line">
+              <a:avLst/>
+            </a:prstGeom>
+            <a:ln w="19050"/>
+          </p:spPr>
+          <p:style>
+            <a:lnRef idx="2">
+              <a:schemeClr val="dk1"/>
+            </a:lnRef>
+            <a:fillRef idx="1">
+              <a:schemeClr val="lt1"/>
+            </a:fillRef>
+            <a:effectRef idx="0">
+              <a:schemeClr val="dk1"/>
+            </a:effectRef>
+            <a:fontRef idx="minor">
+              <a:schemeClr val="dk1"/>
+            </a:fontRef>
+          </p:style>
+        </p:cxnSp>
+        <p:cxnSp>
+          <p:nvCxnSpPr>
+            <p:cNvPr id="40" name="Straight Connector 39"/>
+            <p:cNvCxnSpPr>
+              <a:stCxn id="8" idx="2"/>
+              <a:endCxn id="9" idx="0"/>
+            </p:cNvCxnSpPr>
+            <p:nvPr/>
+          </p:nvCxnSpPr>
+          <p:spPr>
+            <a:xfrm flipH="1">
+              <a:off x="1548101" y="3121346"/>
+              <a:ext cx="7126468" cy="1069631"/>
+            </a:xfrm>
+            <a:prstGeom prst="line">
+              <a:avLst/>
+            </a:prstGeom>
+            <a:ln w="19050"/>
+          </p:spPr>
+          <p:style>
+            <a:lnRef idx="2">
+              <a:schemeClr val="dk1"/>
+            </a:lnRef>
+            <a:fillRef idx="1">
+              <a:schemeClr val="lt1"/>
+            </a:fillRef>
+            <a:effectRef idx="0">
+              <a:schemeClr val="dk1"/>
+            </a:effectRef>
+            <a:fontRef idx="minor">
+              <a:schemeClr val="dk1"/>
+            </a:fontRef>
+          </p:style>
+        </p:cxnSp>
+        <p:cxnSp>
+          <p:nvCxnSpPr>
+            <p:cNvPr id="43" name="Straight Connector 42"/>
+            <p:cNvCxnSpPr>
+              <a:stCxn id="11" idx="0"/>
+              <a:endCxn id="4" idx="2"/>
+            </p:cNvCxnSpPr>
+            <p:nvPr/>
+          </p:nvCxnSpPr>
+          <p:spPr>
+            <a:xfrm flipH="1" flipV="1">
+              <a:off x="1721120" y="3121346"/>
+              <a:ext cx="2313228" cy="1069631"/>
+            </a:xfrm>
+            <a:prstGeom prst="line">
+              <a:avLst/>
+            </a:prstGeom>
+            <a:ln w="19050"/>
+          </p:spPr>
+          <p:style>
+            <a:lnRef idx="2">
+              <a:schemeClr val="dk1"/>
+            </a:lnRef>
+            <a:fillRef idx="1">
+              <a:schemeClr val="lt1"/>
+            </a:fillRef>
+            <a:effectRef idx="0">
+              <a:schemeClr val="dk1"/>
+            </a:effectRef>
+            <a:fontRef idx="minor">
+              <a:schemeClr val="dk1"/>
+            </a:fontRef>
+          </p:style>
+        </p:cxnSp>
+        <p:cxnSp>
+          <p:nvCxnSpPr>
+            <p:cNvPr id="46" name="Straight Connector 45"/>
+            <p:cNvCxnSpPr>
+              <a:stCxn id="11" idx="0"/>
+              <a:endCxn id="6" idx="2"/>
+            </p:cNvCxnSpPr>
+            <p:nvPr/>
+          </p:nvCxnSpPr>
+          <p:spPr>
+            <a:xfrm flipV="1">
+              <a:off x="4034348" y="3121346"/>
+              <a:ext cx="1163496" cy="1069631"/>
+            </a:xfrm>
+            <a:prstGeom prst="line">
+              <a:avLst/>
+            </a:prstGeom>
+            <a:ln w="19050"/>
+          </p:spPr>
+          <p:style>
+            <a:lnRef idx="2">
+              <a:schemeClr val="dk1"/>
+            </a:lnRef>
+            <a:fillRef idx="1">
+              <a:schemeClr val="lt1"/>
+            </a:fillRef>
+            <a:effectRef idx="0">
+              <a:schemeClr val="dk1"/>
+            </a:effectRef>
+            <a:fontRef idx="minor">
+              <a:schemeClr val="dk1"/>
+            </a:fontRef>
+          </p:style>
+        </p:cxnSp>
+        <p:cxnSp>
+          <p:nvCxnSpPr>
+            <p:cNvPr id="52" name="Straight Connector 51"/>
+            <p:cNvCxnSpPr>
+              <a:stCxn id="10" idx="0"/>
+              <a:endCxn id="6" idx="2"/>
+            </p:cNvCxnSpPr>
+            <p:nvPr/>
+          </p:nvCxnSpPr>
+          <p:spPr>
+            <a:xfrm flipH="1" flipV="1">
+              <a:off x="5197844" y="3121346"/>
+              <a:ext cx="1249901" cy="1069631"/>
+            </a:xfrm>
+            <a:prstGeom prst="line">
+              <a:avLst/>
+            </a:prstGeom>
+            <a:ln w="19050"/>
+          </p:spPr>
+          <p:style>
+            <a:lnRef idx="2">
+              <a:schemeClr val="dk1"/>
+            </a:lnRef>
+            <a:fillRef idx="1">
+              <a:schemeClr val="lt1"/>
+            </a:fillRef>
+            <a:effectRef idx="0">
+              <a:schemeClr val="dk1"/>
+            </a:effectRef>
+            <a:fontRef idx="minor">
+              <a:schemeClr val="dk1"/>
+            </a:fontRef>
+          </p:style>
+        </p:cxnSp>
+        <p:cxnSp>
+          <p:nvCxnSpPr>
+            <p:cNvPr id="56" name="Straight Connector 55"/>
+            <p:cNvCxnSpPr>
+              <a:stCxn id="10" idx="0"/>
+              <a:endCxn id="8" idx="2"/>
+            </p:cNvCxnSpPr>
+            <p:nvPr/>
+          </p:nvCxnSpPr>
+          <p:spPr>
+            <a:xfrm flipV="1">
+              <a:off x="6447745" y="3121346"/>
+              <a:ext cx="2226824" cy="1069631"/>
+            </a:xfrm>
+            <a:prstGeom prst="line">
+              <a:avLst/>
+            </a:prstGeom>
+            <a:ln w="19050"/>
+          </p:spPr>
+          <p:style>
+            <a:lnRef idx="2">
+              <a:schemeClr val="dk1"/>
+            </a:lnRef>
+            <a:fillRef idx="1">
+              <a:schemeClr val="lt1"/>
+            </a:fillRef>
+            <a:effectRef idx="0">
+              <a:schemeClr val="dk1"/>
+            </a:effectRef>
+            <a:fontRef idx="minor">
+              <a:schemeClr val="dk1"/>
+            </a:fontRef>
+          </p:style>
+        </p:cxnSp>
+        <p:sp>
+          <p:nvSpPr>
+            <p:cNvPr id="66" name="TextBox 65"/>
+            <p:cNvSpPr txBox="1"/>
+            <p:nvPr/>
+          </p:nvSpPr>
+          <p:spPr>
+            <a:xfrm>
+              <a:off x="9972352" y="787423"/>
+              <a:ext cx="1987826" cy="369332"/>
+            </a:xfrm>
+            <a:prstGeom prst="rect">
+              <a:avLst/>
+            </a:prstGeom>
+            <a:noFill/>
+          </p:spPr>
+          <p:txBody>
+            <a:bodyPr wrap="square" rtlCol="0">
+              <a:spAutoFit/>
+            </a:bodyPr>
+            <a:lstStyle/>
+            <a:p>
+              <a:r>
+                <a:rPr lang="en-US" b="1" dirty="0"/>
+                <a:t>Applications</a:t>
+              </a:r>
+            </a:p>
+          </p:txBody>
+        </p:sp>
+        <p:sp>
+          <p:nvSpPr>
+            <p:cNvPr id="70" name="TextBox 69"/>
+            <p:cNvSpPr txBox="1"/>
+            <p:nvPr/>
+          </p:nvSpPr>
+          <p:spPr>
+            <a:xfrm>
+              <a:off x="9874852" y="2438306"/>
+              <a:ext cx="1987826" cy="646331"/>
+            </a:xfrm>
+            <a:prstGeom prst="rect">
+              <a:avLst/>
+            </a:prstGeom>
+            <a:noFill/>
+          </p:spPr>
+          <p:txBody>
+            <a:bodyPr wrap="square" rtlCol="0">
+              <a:spAutoFit/>
+            </a:bodyPr>
+            <a:lstStyle/>
+            <a:p>
+              <a:r>
+                <a:rPr lang="en-US" b="1" dirty="0"/>
+                <a:t>Natural language processing tasks</a:t>
+              </a:r>
+            </a:p>
+          </p:txBody>
+        </p:sp>
+        <p:sp>
+          <p:nvSpPr>
+            <p:cNvPr id="72" name="TextBox 71"/>
+            <p:cNvSpPr txBox="1"/>
+            <p:nvPr/>
+          </p:nvSpPr>
+          <p:spPr>
+            <a:xfrm>
+              <a:off x="9874852" y="4233727"/>
+              <a:ext cx="1987826" cy="646331"/>
+            </a:xfrm>
+            <a:prstGeom prst="rect">
+              <a:avLst/>
+            </a:prstGeom>
+            <a:noFill/>
+          </p:spPr>
+          <p:txBody>
+            <a:bodyPr wrap="square" rtlCol="0">
+              <a:spAutoFit/>
+            </a:bodyPr>
+            <a:lstStyle/>
+            <a:p>
+              <a:r>
+                <a:rPr lang="en-US" b="1" dirty="0"/>
+                <a:t>Deep </a:t>
+              </a:r>
+              <a:r>
+                <a:rPr lang="en-US" b="1"/>
+                <a:t>learning models</a:t>
+              </a:r>
+              <a:endParaRPr lang="en-US" b="1" dirty="0"/>
+            </a:p>
+          </p:txBody>
+        </p:sp>
+        <p:cxnSp>
+          <p:nvCxnSpPr>
+            <p:cNvPr id="47" name="Straight Connector 46"/>
+            <p:cNvCxnSpPr>
+              <a:stCxn id="12" idx="0"/>
+              <a:endCxn id="6" idx="2"/>
+            </p:cNvCxnSpPr>
+            <p:nvPr/>
+          </p:nvCxnSpPr>
+          <p:spPr>
+            <a:xfrm flipH="1" flipV="1">
+              <a:off x="5197844" y="3121346"/>
+              <a:ext cx="3581991" cy="1069631"/>
+            </a:xfrm>
+            <a:prstGeom prst="line">
+              <a:avLst/>
+            </a:prstGeom>
+            <a:ln w="19050"/>
+          </p:spPr>
+          <p:style>
+            <a:lnRef idx="2">
+              <a:schemeClr val="dk1"/>
+            </a:lnRef>
+            <a:fillRef idx="1">
+              <a:schemeClr val="lt1"/>
+            </a:fillRef>
+            <a:effectRef idx="0">
+              <a:schemeClr val="dk1"/>
+            </a:effectRef>
+            <a:fontRef idx="minor">
+              <a:schemeClr val="dk1"/>
+            </a:fontRef>
+          </p:style>
+        </p:cxnSp>
       </p:grpSp>
-      <p:cxnSp>
-        <p:nvCxnSpPr>
-          <p:cNvPr id="15" name="Straight Connector 14"/>
-          <p:cNvCxnSpPr>
-            <a:stCxn id="5" idx="2"/>
-            <a:endCxn id="4" idx="0"/>
-          </p:cNvCxnSpPr>
-          <p:nvPr/>
-        </p:nvCxnSpPr>
-        <p:spPr>
-          <a:xfrm flipH="1">
-            <a:off x="1721120" y="1331964"/>
-            <a:ext cx="2349425" cy="1069632"/>
-          </a:xfrm>
-          <a:prstGeom prst="line">
-            <a:avLst/>
-          </a:prstGeom>
-          <a:ln w="19050"/>
-        </p:spPr>
-        <p:style>
-          <a:lnRef idx="2">
-            <a:schemeClr val="dk1"/>
-          </a:lnRef>
-          <a:fillRef idx="1">
-            <a:schemeClr val="lt1"/>
-          </a:fillRef>
-          <a:effectRef idx="0">
-            <a:schemeClr val="dk1"/>
-          </a:effectRef>
-          <a:fontRef idx="minor">
-            <a:schemeClr val="dk1"/>
-          </a:fontRef>
-        </p:style>
-      </p:cxnSp>
-      <p:cxnSp>
-        <p:nvCxnSpPr>
-          <p:cNvPr id="16" name="Straight Connector 15"/>
-          <p:cNvCxnSpPr>
-            <a:stCxn id="5" idx="2"/>
-            <a:endCxn id="6" idx="0"/>
-          </p:cNvCxnSpPr>
-          <p:nvPr/>
-        </p:nvCxnSpPr>
-        <p:spPr>
-          <a:xfrm>
-            <a:off x="4070545" y="1331964"/>
-            <a:ext cx="1127299" cy="1069632"/>
-          </a:xfrm>
-          <a:prstGeom prst="line">
-            <a:avLst/>
-          </a:prstGeom>
-          <a:ln w="19050"/>
-        </p:spPr>
-        <p:style>
-          <a:lnRef idx="2">
-            <a:schemeClr val="dk1"/>
-          </a:lnRef>
-          <a:fillRef idx="1">
-            <a:schemeClr val="lt1"/>
-          </a:fillRef>
-          <a:effectRef idx="0">
-            <a:schemeClr val="dk1"/>
-          </a:effectRef>
-          <a:fontRef idx="minor">
-            <a:schemeClr val="dk1"/>
-          </a:fontRef>
-        </p:style>
-      </p:cxnSp>
-      <p:cxnSp>
-        <p:nvCxnSpPr>
-          <p:cNvPr id="22" name="Straight Connector 21"/>
-          <p:cNvCxnSpPr>
-            <a:stCxn id="5" idx="2"/>
-            <a:endCxn id="8" idx="0"/>
-          </p:cNvCxnSpPr>
-          <p:nvPr/>
-        </p:nvCxnSpPr>
-        <p:spPr>
-          <a:xfrm>
-            <a:off x="4070545" y="1331964"/>
-            <a:ext cx="4604024" cy="1069632"/>
-          </a:xfrm>
-          <a:prstGeom prst="line">
-            <a:avLst/>
-          </a:prstGeom>
-          <a:ln w="19050"/>
-        </p:spPr>
-        <p:style>
-          <a:lnRef idx="2">
-            <a:schemeClr val="dk1"/>
-          </a:lnRef>
-          <a:fillRef idx="1">
-            <a:schemeClr val="lt1"/>
-          </a:fillRef>
-          <a:effectRef idx="0">
-            <a:schemeClr val="dk1"/>
-          </a:effectRef>
-          <a:fontRef idx="minor">
-            <a:schemeClr val="dk1"/>
-          </a:fontRef>
-        </p:style>
-      </p:cxnSp>
-      <p:cxnSp>
-        <p:nvCxnSpPr>
-          <p:cNvPr id="25" name="Straight Connector 24"/>
-          <p:cNvCxnSpPr>
-            <a:stCxn id="2" idx="2"/>
-            <a:endCxn id="4" idx="0"/>
-          </p:cNvCxnSpPr>
-          <p:nvPr/>
-        </p:nvCxnSpPr>
-        <p:spPr>
-          <a:xfrm flipH="1">
-            <a:off x="1721120" y="1331964"/>
-            <a:ext cx="4604025" cy="1069632"/>
-          </a:xfrm>
-          <a:prstGeom prst="line">
-            <a:avLst/>
-          </a:prstGeom>
-          <a:ln w="19050"/>
-        </p:spPr>
-        <p:style>
-          <a:lnRef idx="2">
-            <a:schemeClr val="dk1"/>
-          </a:lnRef>
-          <a:fillRef idx="1">
-            <a:schemeClr val="lt1"/>
-          </a:fillRef>
-          <a:effectRef idx="0">
-            <a:schemeClr val="dk1"/>
-          </a:effectRef>
-          <a:fontRef idx="minor">
-            <a:schemeClr val="dk1"/>
-          </a:fontRef>
-        </p:style>
-      </p:cxnSp>
-      <p:cxnSp>
-        <p:nvCxnSpPr>
-          <p:cNvPr id="28" name="Straight Connector 27"/>
-          <p:cNvCxnSpPr>
-            <a:stCxn id="2" idx="2"/>
-            <a:endCxn id="6" idx="0"/>
-          </p:cNvCxnSpPr>
-          <p:nvPr/>
-        </p:nvCxnSpPr>
-        <p:spPr>
-          <a:xfrm flipH="1">
-            <a:off x="5197844" y="1331964"/>
-            <a:ext cx="1127301" cy="1069632"/>
-          </a:xfrm>
-          <a:prstGeom prst="line">
-            <a:avLst/>
-          </a:prstGeom>
-          <a:ln w="19050"/>
-        </p:spPr>
-        <p:style>
-          <a:lnRef idx="2">
-            <a:schemeClr val="dk1"/>
-          </a:lnRef>
-          <a:fillRef idx="1">
-            <a:schemeClr val="lt1"/>
-          </a:fillRef>
-          <a:effectRef idx="0">
-            <a:schemeClr val="dk1"/>
-          </a:effectRef>
-          <a:fontRef idx="minor">
-            <a:schemeClr val="dk1"/>
-          </a:fontRef>
-        </p:style>
-      </p:cxnSp>
-      <p:cxnSp>
-        <p:nvCxnSpPr>
-          <p:cNvPr id="31" name="Straight Connector 30"/>
-          <p:cNvCxnSpPr>
-            <a:stCxn id="4" idx="2"/>
-            <a:endCxn id="9" idx="0"/>
-          </p:cNvCxnSpPr>
-          <p:nvPr/>
-        </p:nvCxnSpPr>
-        <p:spPr>
-          <a:xfrm flipH="1">
-            <a:off x="1548101" y="3121346"/>
-            <a:ext cx="173019" cy="1069631"/>
-          </a:xfrm>
-          <a:prstGeom prst="line">
-            <a:avLst/>
-          </a:prstGeom>
-          <a:ln w="19050"/>
-        </p:spPr>
-        <p:style>
-          <a:lnRef idx="2">
-            <a:schemeClr val="dk1"/>
-          </a:lnRef>
-          <a:fillRef idx="1">
-            <a:schemeClr val="lt1"/>
-          </a:fillRef>
-          <a:effectRef idx="0">
-            <a:schemeClr val="dk1"/>
-          </a:effectRef>
-          <a:fontRef idx="minor">
-            <a:schemeClr val="dk1"/>
-          </a:fontRef>
-        </p:style>
-      </p:cxnSp>
-      <p:cxnSp>
-        <p:nvCxnSpPr>
-          <p:cNvPr id="34" name="Straight Connector 33"/>
-          <p:cNvCxnSpPr>
-            <a:stCxn id="6" idx="2"/>
-            <a:endCxn id="9" idx="0"/>
-          </p:cNvCxnSpPr>
-          <p:nvPr/>
-        </p:nvCxnSpPr>
-        <p:spPr>
-          <a:xfrm flipH="1">
-            <a:off x="1548101" y="3121346"/>
-            <a:ext cx="3649743" cy="1069631"/>
-          </a:xfrm>
-          <a:prstGeom prst="line">
-            <a:avLst/>
-          </a:prstGeom>
-          <a:ln w="19050"/>
-        </p:spPr>
-        <p:style>
-          <a:lnRef idx="2">
-            <a:schemeClr val="dk1"/>
-          </a:lnRef>
-          <a:fillRef idx="1">
-            <a:schemeClr val="lt1"/>
-          </a:fillRef>
-          <a:effectRef idx="0">
-            <a:schemeClr val="dk1"/>
-          </a:effectRef>
-          <a:fontRef idx="minor">
-            <a:schemeClr val="dk1"/>
-          </a:fontRef>
-        </p:style>
-      </p:cxnSp>
-      <p:cxnSp>
-        <p:nvCxnSpPr>
-          <p:cNvPr id="40" name="Straight Connector 39"/>
-          <p:cNvCxnSpPr>
-            <a:stCxn id="8" idx="2"/>
-            <a:endCxn id="9" idx="0"/>
-          </p:cNvCxnSpPr>
-          <p:nvPr/>
-        </p:nvCxnSpPr>
-        <p:spPr>
-          <a:xfrm flipH="1">
-            <a:off x="1548101" y="3121346"/>
-            <a:ext cx="7126468" cy="1069631"/>
-          </a:xfrm>
-          <a:prstGeom prst="line">
-            <a:avLst/>
-          </a:prstGeom>
-          <a:ln w="19050"/>
-        </p:spPr>
-        <p:style>
-          <a:lnRef idx="2">
-            <a:schemeClr val="dk1"/>
-          </a:lnRef>
-          <a:fillRef idx="1">
-            <a:schemeClr val="lt1"/>
-          </a:fillRef>
-          <a:effectRef idx="0">
-            <a:schemeClr val="dk1"/>
-          </a:effectRef>
-          <a:fontRef idx="minor">
-            <a:schemeClr val="dk1"/>
-          </a:fontRef>
-        </p:style>
-      </p:cxnSp>
-      <p:cxnSp>
-        <p:nvCxnSpPr>
-          <p:cNvPr id="43" name="Straight Connector 42"/>
-          <p:cNvCxnSpPr>
-            <a:stCxn id="11" idx="0"/>
-            <a:endCxn id="4" idx="2"/>
-          </p:cNvCxnSpPr>
-          <p:nvPr/>
-        </p:nvCxnSpPr>
-        <p:spPr>
-          <a:xfrm flipH="1" flipV="1">
-            <a:off x="1721120" y="3121346"/>
-            <a:ext cx="4625552" cy="1069631"/>
-          </a:xfrm>
-          <a:prstGeom prst="line">
-            <a:avLst/>
-          </a:prstGeom>
-          <a:ln w="19050"/>
-        </p:spPr>
-        <p:style>
-          <a:lnRef idx="2">
-            <a:schemeClr val="dk1"/>
-          </a:lnRef>
-          <a:fillRef idx="1">
-            <a:schemeClr val="lt1"/>
-          </a:fillRef>
-          <a:effectRef idx="0">
-            <a:schemeClr val="dk1"/>
-          </a:effectRef>
-          <a:fontRef idx="minor">
-            <a:schemeClr val="dk1"/>
-          </a:fontRef>
-        </p:style>
-      </p:cxnSp>
-      <p:cxnSp>
-        <p:nvCxnSpPr>
-          <p:cNvPr id="46" name="Straight Connector 45"/>
-          <p:cNvCxnSpPr>
-            <a:stCxn id="11" idx="0"/>
-            <a:endCxn id="6" idx="2"/>
-          </p:cNvCxnSpPr>
-          <p:nvPr/>
-        </p:nvCxnSpPr>
-        <p:spPr>
-          <a:xfrm flipH="1" flipV="1">
-            <a:off x="5197844" y="3121346"/>
-            <a:ext cx="1148828" cy="1069631"/>
-          </a:xfrm>
-          <a:prstGeom prst="line">
-            <a:avLst/>
-          </a:prstGeom>
-          <a:ln w="19050"/>
-        </p:spPr>
-        <p:style>
-          <a:lnRef idx="2">
-            <a:schemeClr val="dk1"/>
-          </a:lnRef>
-          <a:fillRef idx="1">
-            <a:schemeClr val="lt1"/>
-          </a:fillRef>
-          <a:effectRef idx="0">
-            <a:schemeClr val="dk1"/>
-          </a:effectRef>
-          <a:fontRef idx="minor">
-            <a:schemeClr val="dk1"/>
-          </a:fontRef>
-        </p:style>
-      </p:cxnSp>
-      <p:cxnSp>
-        <p:nvCxnSpPr>
-          <p:cNvPr id="52" name="Straight Connector 51"/>
-          <p:cNvCxnSpPr>
-            <a:stCxn id="10" idx="0"/>
-            <a:endCxn id="6" idx="2"/>
-          </p:cNvCxnSpPr>
-          <p:nvPr/>
-        </p:nvCxnSpPr>
-        <p:spPr>
-          <a:xfrm flipV="1">
-            <a:off x="3913510" y="3121346"/>
-            <a:ext cx="1284334" cy="1069631"/>
-          </a:xfrm>
-          <a:prstGeom prst="line">
-            <a:avLst/>
-          </a:prstGeom>
-          <a:ln w="19050"/>
-        </p:spPr>
-        <p:style>
-          <a:lnRef idx="2">
-            <a:schemeClr val="dk1"/>
-          </a:lnRef>
-          <a:fillRef idx="1">
-            <a:schemeClr val="lt1"/>
-          </a:fillRef>
-          <a:effectRef idx="0">
-            <a:schemeClr val="dk1"/>
-          </a:effectRef>
-          <a:fontRef idx="minor">
-            <a:schemeClr val="dk1"/>
-          </a:fontRef>
-        </p:style>
-      </p:cxnSp>
-      <p:cxnSp>
-        <p:nvCxnSpPr>
-          <p:cNvPr id="56" name="Straight Connector 55"/>
-          <p:cNvCxnSpPr>
-            <a:stCxn id="10" idx="0"/>
-            <a:endCxn id="8" idx="2"/>
-          </p:cNvCxnSpPr>
-          <p:nvPr/>
-        </p:nvCxnSpPr>
-        <p:spPr>
-          <a:xfrm flipV="1">
-            <a:off x="3913510" y="3121346"/>
-            <a:ext cx="4761059" cy="1069631"/>
-          </a:xfrm>
-          <a:prstGeom prst="line">
-            <a:avLst/>
-          </a:prstGeom>
-          <a:ln w="19050"/>
-        </p:spPr>
-        <p:style>
-          <a:lnRef idx="2">
-            <a:schemeClr val="dk1"/>
-          </a:lnRef>
-          <a:fillRef idx="1">
-            <a:schemeClr val="lt1"/>
-          </a:fillRef>
-          <a:effectRef idx="0">
-            <a:schemeClr val="dk1"/>
-          </a:effectRef>
-          <a:fontRef idx="minor">
-            <a:schemeClr val="dk1"/>
-          </a:fontRef>
-        </p:style>
-      </p:cxnSp>
-      <p:sp>
-        <p:nvSpPr>
-          <p:cNvPr id="66" name="TextBox 65"/>
-          <p:cNvSpPr txBox="1"/>
-          <p:nvPr/>
-        </p:nvSpPr>
-        <p:spPr>
-          <a:xfrm>
-            <a:off x="9972352" y="787423"/>
-            <a:ext cx="1987826" cy="369332"/>
-          </a:xfrm>
-          <a:prstGeom prst="rect">
-            <a:avLst/>
-          </a:prstGeom>
-          <a:noFill/>
-        </p:spPr>
-        <p:txBody>
-          <a:bodyPr wrap="square" rtlCol="0">
-            <a:spAutoFit/>
-          </a:bodyPr>
-          <a:lstStyle/>
-          <a:p>
-            <a:r>
-              <a:rPr lang="en-US" b="1" dirty="0"/>
-              <a:t>Applications</a:t>
-            </a:r>
-          </a:p>
-        </p:txBody>
-      </p:sp>
-      <p:sp>
-        <p:nvSpPr>
-          <p:cNvPr id="70" name="TextBox 69"/>
-          <p:cNvSpPr txBox="1"/>
-          <p:nvPr/>
-        </p:nvSpPr>
-        <p:spPr>
-          <a:xfrm>
-            <a:off x="9874852" y="2438306"/>
-            <a:ext cx="1987826" cy="646331"/>
-          </a:xfrm>
-          <a:prstGeom prst="rect">
-            <a:avLst/>
-          </a:prstGeom>
-          <a:noFill/>
-        </p:spPr>
-        <p:txBody>
-          <a:bodyPr wrap="square" rtlCol="0">
-            <a:spAutoFit/>
-          </a:bodyPr>
-          <a:lstStyle/>
-          <a:p>
-            <a:r>
-              <a:rPr lang="en-US" b="1" dirty="0"/>
-              <a:t>Natural language processing tasks</a:t>
-            </a:r>
-          </a:p>
-        </p:txBody>
-      </p:sp>
-      <p:sp>
-        <p:nvSpPr>
-          <p:cNvPr id="72" name="TextBox 71"/>
-          <p:cNvSpPr txBox="1"/>
-          <p:nvPr/>
-        </p:nvSpPr>
-        <p:spPr>
-          <a:xfrm>
-            <a:off x="9874852" y="4233727"/>
-            <a:ext cx="1987826" cy="646331"/>
-          </a:xfrm>
-          <a:prstGeom prst="rect">
-            <a:avLst/>
-          </a:prstGeom>
-          <a:noFill/>
-        </p:spPr>
-        <p:txBody>
-          <a:bodyPr wrap="square" rtlCol="0">
-            <a:spAutoFit/>
-          </a:bodyPr>
-          <a:lstStyle/>
-          <a:p>
-            <a:r>
-              <a:rPr lang="en-US" b="1" dirty="0"/>
-              <a:t>Deep </a:t>
-            </a:r>
-            <a:r>
-              <a:rPr lang="en-US" b="1"/>
-              <a:t>learning models</a:t>
-            </a:r>
-            <a:endParaRPr lang="en-US" b="1" dirty="0"/>
-          </a:p>
-        </p:txBody>
-      </p:sp>
-      <p:cxnSp>
-        <p:nvCxnSpPr>
-          <p:cNvPr id="47" name="Straight Connector 46"/>
-          <p:cNvCxnSpPr>
-            <a:stCxn id="12" idx="0"/>
-            <a:endCxn id="6" idx="2"/>
-          </p:cNvCxnSpPr>
-          <p:nvPr/>
-        </p:nvCxnSpPr>
-        <p:spPr>
-          <a:xfrm flipH="1" flipV="1">
-            <a:off x="5197844" y="3121346"/>
-            <a:ext cx="3581991" cy="1069631"/>
-          </a:xfrm>
-          <a:prstGeom prst="line">
-            <a:avLst/>
-          </a:prstGeom>
-          <a:ln w="19050"/>
-        </p:spPr>
-        <p:style>
-          <a:lnRef idx="2">
-            <a:schemeClr val="dk1"/>
-          </a:lnRef>
-          <a:fillRef idx="1">
-            <a:schemeClr val="lt1"/>
-          </a:fillRef>
-          <a:effectRef idx="0">
-            <a:schemeClr val="dk1"/>
-          </a:effectRef>
-          <a:fontRef idx="minor">
-            <a:schemeClr val="dk1"/>
-          </a:fontRef>
-        </p:style>
-      </p:cxnSp>
     </p:spTree>
     <p:extLst>
       <p:ext uri="{BB962C8B-B14F-4D97-AF65-F5344CB8AC3E}">

</xml_diff>